<commit_message>
reviewed ppt and made further changes
</commit_message>
<xml_diff>
--- a/LeandingClub-CaseStudy.pptx
+++ b/LeandingClub-CaseStudy.pptx
@@ -6780,7 +6780,7 @@
           <a:p>
             <a:fld id="{BDC5F7DD-F8CC-455F-84F9-B40DC0416614}" type="datetimeFigureOut">
               <a:rPr lang="en-IN" smtClean="0"/>
-              <a:t>27-09-2022</a:t>
+              <a:t>28-09-2022</a:t>
             </a:fld>
             <a:endParaRPr lang="en-IN"/>
           </a:p>
@@ -10949,8 +10949,24 @@
                   </a:schemeClr>
                 </a:solidFill>
               </a:rPr>
-              <a:t>         Data Insights - 5/10</a:t>
-            </a:r>
+              <a:t>         Bivariate Analysis – Home Ownership </a:t>
+            </a:r>
+            <a:br>
+              <a:rPr lang="en-US" altLang="en-US" sz="3500" dirty="0">
+                <a:solidFill>
+                  <a:schemeClr val="accent1">
+                    <a:lumMod val="90000"/>
+                  </a:schemeClr>
+                </a:solidFill>
+              </a:rPr>
+            </a:br>
+            <a:endParaRPr lang="en-US" altLang="en-US" sz="3500" dirty="0">
+              <a:solidFill>
+                <a:schemeClr val="accent1">
+                  <a:lumMod val="90000"/>
+                </a:schemeClr>
+              </a:solidFill>
+            </a:endParaRPr>
           </a:p>
         </p:txBody>
       </p:sp>
@@ -10968,8 +10984,8 @@
         </p:nvSpPr>
         <p:spPr>
           <a:xfrm>
-            <a:off x="2673069" y="1090013"/>
-            <a:ext cx="5615576" cy="477054"/>
+            <a:off x="3779912" y="903500"/>
+            <a:ext cx="2965877" cy="477054"/>
           </a:xfrm>
           <a:prstGeom prst="rect">
             <a:avLst/>
@@ -10984,13 +11000,18 @@
           <a:p>
             <a:pPr algn="ctr"/>
             <a:r>
-              <a:rPr lang="en-IN" sz="2500" dirty="0">
+              <a:rPr lang="en-IN" sz="2500">
                 <a:solidFill>
                   <a:schemeClr val="bg1"/>
                 </a:solidFill>
               </a:rPr>
-              <a:t>Bivariate Analysis – Home Ownership </a:t>
-            </a:r>
+              <a:t>Data Insights - 5/10</a:t>
+            </a:r>
+            <a:endParaRPr lang="en-IN" sz="2500" dirty="0">
+              <a:solidFill>
+                <a:schemeClr val="bg1"/>
+              </a:solidFill>
+            </a:endParaRPr>
           </a:p>
         </p:txBody>
       </p:sp>
@@ -11319,7 +11340,7 @@
         </p:nvSpPr>
         <p:spPr>
           <a:xfrm>
-            <a:off x="1846955" y="132783"/>
+            <a:off x="1839822" y="304742"/>
             <a:ext cx="6480000" cy="981075"/>
           </a:xfrm>
         </p:spPr>
@@ -11336,8 +11357,43 @@
                   </a:schemeClr>
                 </a:solidFill>
               </a:rPr>
-              <a:t>         Data Insights - 6/10</a:t>
-            </a:r>
+              <a:t>Bivariate Analysis – </a:t>
+            </a:r>
+            <a:br>
+              <a:rPr lang="en-US" altLang="en-US" sz="3500" dirty="0">
+                <a:solidFill>
+                  <a:schemeClr val="accent1">
+                    <a:lumMod val="90000"/>
+                  </a:schemeClr>
+                </a:solidFill>
+              </a:rPr>
+            </a:br>
+            <a:r>
+              <a:rPr lang="en-US" altLang="en-US" sz="3500" dirty="0">
+                <a:solidFill>
+                  <a:schemeClr val="accent1">
+                    <a:lumMod val="90000"/>
+                  </a:schemeClr>
+                </a:solidFill>
+              </a:rPr>
+              <a:t>DTI Vs Loan Status </a:t>
+            </a:r>
+            <a:br>
+              <a:rPr lang="en-US" altLang="en-US" sz="3500" dirty="0">
+                <a:solidFill>
+                  <a:schemeClr val="accent1">
+                    <a:lumMod val="90000"/>
+                  </a:schemeClr>
+                </a:solidFill>
+              </a:rPr>
+            </a:br>
+            <a:endParaRPr lang="en-US" altLang="en-US" sz="3500" dirty="0">
+              <a:solidFill>
+                <a:schemeClr val="accent1">
+                  <a:lumMod val="90000"/>
+                </a:schemeClr>
+              </a:solidFill>
+            </a:endParaRPr>
           </a:p>
         </p:txBody>
       </p:sp>
@@ -11355,8 +11411,8 @@
         </p:nvSpPr>
         <p:spPr>
           <a:xfrm>
-            <a:off x="2835702" y="980728"/>
-            <a:ext cx="5920147" cy="477054"/>
+            <a:off x="3596883" y="1081187"/>
+            <a:ext cx="2965877" cy="477054"/>
           </a:xfrm>
           <a:prstGeom prst="rect">
             <a:avLst/>
@@ -11376,7 +11432,7 @@
                   <a:schemeClr val="bg1"/>
                 </a:solidFill>
               </a:rPr>
-              <a:t>Bivariate Analysis – DTI Vs Loan Status </a:t>
+              <a:t>Data Insights - 6/10</a:t>
             </a:r>
           </a:p>
         </p:txBody>
@@ -11901,7 +11957,7 @@
         </p:nvSpPr>
         <p:spPr>
           <a:xfrm>
-            <a:off x="1686173" y="188640"/>
+            <a:off x="1907704" y="358186"/>
             <a:ext cx="6480000" cy="981075"/>
           </a:xfrm>
         </p:spPr>
@@ -11918,8 +11974,43 @@
                   </a:schemeClr>
                 </a:solidFill>
               </a:rPr>
-              <a:t>         Data Insights - 7/10</a:t>
-            </a:r>
+              <a:t> Bivariate Analysis – </a:t>
+            </a:r>
+            <a:br>
+              <a:rPr lang="en-US" altLang="en-US" sz="3500" dirty="0">
+                <a:solidFill>
+                  <a:schemeClr val="accent1">
+                    <a:lumMod val="90000"/>
+                  </a:schemeClr>
+                </a:solidFill>
+              </a:rPr>
+            </a:br>
+            <a:r>
+              <a:rPr lang="en-US" altLang="en-US" sz="3500" dirty="0">
+                <a:solidFill>
+                  <a:schemeClr val="accent1">
+                    <a:lumMod val="90000"/>
+                  </a:schemeClr>
+                </a:solidFill>
+              </a:rPr>
+              <a:t>Loan Purpose &amp; P&amp;L</a:t>
+            </a:r>
+            <a:br>
+              <a:rPr lang="en-US" altLang="en-US" sz="3500" dirty="0">
+                <a:solidFill>
+                  <a:schemeClr val="accent1">
+                    <a:lumMod val="90000"/>
+                  </a:schemeClr>
+                </a:solidFill>
+              </a:rPr>
+            </a:br>
+            <a:endParaRPr lang="en-US" altLang="en-US" sz="3500" dirty="0">
+              <a:solidFill>
+                <a:schemeClr val="accent1">
+                  <a:lumMod val="90000"/>
+                </a:schemeClr>
+              </a:solidFill>
+            </a:endParaRPr>
           </a:p>
         </p:txBody>
       </p:sp>
@@ -11937,8 +12028,8 @@
         </p:nvSpPr>
         <p:spPr>
           <a:xfrm>
-            <a:off x="2459872" y="1090012"/>
-            <a:ext cx="6041974" cy="477054"/>
+            <a:off x="3709941" y="1100734"/>
+            <a:ext cx="2965877" cy="477054"/>
           </a:xfrm>
           <a:prstGeom prst="rect">
             <a:avLst/>
@@ -11958,7 +12049,7 @@
                   <a:schemeClr val="bg1"/>
                 </a:solidFill>
               </a:rPr>
-              <a:t>Bivariate Analysis – Loan Purpose &amp; P&amp;L</a:t>
+              <a:t>Data Insights - 7/10</a:t>
             </a:r>
           </a:p>
         </p:txBody>
@@ -12322,7 +12413,7 @@
         </p:nvSpPr>
         <p:spPr>
           <a:xfrm>
-            <a:off x="1691680" y="28754"/>
+            <a:off x="1813127" y="298562"/>
             <a:ext cx="6480000" cy="981075"/>
           </a:xfrm>
         </p:spPr>
@@ -12339,8 +12430,43 @@
                   </a:schemeClr>
                 </a:solidFill>
               </a:rPr>
-              <a:t>         Data Insights - 8/10</a:t>
-            </a:r>
+              <a:t>    Bivariate Analysis – </a:t>
+            </a:r>
+            <a:br>
+              <a:rPr lang="en-US" altLang="en-US" sz="3500" dirty="0">
+                <a:solidFill>
+                  <a:schemeClr val="accent1">
+                    <a:lumMod val="90000"/>
+                  </a:schemeClr>
+                </a:solidFill>
+              </a:rPr>
+            </a:br>
+            <a:r>
+              <a:rPr lang="en-US" altLang="en-US" sz="3500" dirty="0">
+                <a:solidFill>
+                  <a:schemeClr val="accent1">
+                    <a:lumMod val="90000"/>
+                  </a:schemeClr>
+                </a:solidFill>
+              </a:rPr>
+              <a:t>Profit &amp; Loss across Grades</a:t>
+            </a:r>
+            <a:br>
+              <a:rPr lang="en-US" altLang="en-US" sz="3500" dirty="0">
+                <a:solidFill>
+                  <a:schemeClr val="accent1">
+                    <a:lumMod val="90000"/>
+                  </a:schemeClr>
+                </a:solidFill>
+              </a:rPr>
+            </a:br>
+            <a:endParaRPr lang="en-US" altLang="en-US" sz="3500" dirty="0">
+              <a:solidFill>
+                <a:schemeClr val="accent1">
+                  <a:lumMod val="90000"/>
+                </a:schemeClr>
+              </a:solidFill>
+            </a:endParaRPr>
           </a:p>
         </p:txBody>
       </p:sp>
@@ -12358,8 +12484,8 @@
         </p:nvSpPr>
         <p:spPr>
           <a:xfrm>
-            <a:off x="1958940" y="1052299"/>
-            <a:ext cx="7043851" cy="477054"/>
+            <a:off x="3635896" y="977255"/>
+            <a:ext cx="2965876" cy="477054"/>
           </a:xfrm>
           <a:prstGeom prst="rect">
             <a:avLst/>
@@ -12379,7 +12505,7 @@
                   <a:schemeClr val="bg1"/>
                 </a:solidFill>
               </a:rPr>
-              <a:t>Bivariate Analysis – Profit &amp; Loss across Grades</a:t>
+              <a:t>Data Insights - 8/10</a:t>
             </a:r>
           </a:p>
         </p:txBody>
@@ -12676,8 +12802,8 @@
         </p:blipFill>
         <p:spPr bwMode="auto">
           <a:xfrm>
-            <a:off x="617900" y="1988840"/>
-            <a:ext cx="3971925" cy="3400425"/>
+            <a:off x="539552" y="1697791"/>
+            <a:ext cx="3450044" cy="2953635"/>
           </a:xfrm>
           <a:prstGeom prst="rect">
             <a:avLst/>
@@ -12712,7 +12838,7 @@
         </p:nvSpPr>
         <p:spPr>
           <a:xfrm>
-            <a:off x="1686173" y="150927"/>
+            <a:off x="1684991" y="318228"/>
             <a:ext cx="6480000" cy="981075"/>
           </a:xfrm>
         </p:spPr>
@@ -12729,8 +12855,43 @@
                   </a:schemeClr>
                 </a:solidFill>
               </a:rPr>
-              <a:t>         Data Insights - 9/10</a:t>
-            </a:r>
+              <a:t>         Bivariate Analysis – Profit &amp; Loss, </a:t>
+            </a:r>
+            <a:br>
+              <a:rPr lang="en-US" altLang="en-US" sz="3500" dirty="0">
+                <a:solidFill>
+                  <a:schemeClr val="accent1">
+                    <a:lumMod val="90000"/>
+                  </a:schemeClr>
+                </a:solidFill>
+              </a:rPr>
+            </a:br>
+            <a:r>
+              <a:rPr lang="en-US" altLang="en-US" sz="3500" dirty="0">
+                <a:solidFill>
+                  <a:schemeClr val="accent1">
+                    <a:lumMod val="90000"/>
+                  </a:schemeClr>
+                </a:solidFill>
+              </a:rPr>
+              <a:t>Income, Loan Amount</a:t>
+            </a:r>
+            <a:br>
+              <a:rPr lang="en-US" altLang="en-US" sz="3500" dirty="0">
+                <a:solidFill>
+                  <a:schemeClr val="accent1">
+                    <a:lumMod val="90000"/>
+                  </a:schemeClr>
+                </a:solidFill>
+              </a:rPr>
+            </a:br>
+            <a:endParaRPr lang="en-US" altLang="en-US" sz="3500" dirty="0">
+              <a:solidFill>
+                <a:schemeClr val="accent1">
+                  <a:lumMod val="90000"/>
+                </a:schemeClr>
+              </a:solidFill>
+            </a:endParaRPr>
           </a:p>
         </p:txBody>
       </p:sp>
@@ -12748,8 +12909,8 @@
         </p:nvSpPr>
         <p:spPr>
           <a:xfrm>
-            <a:off x="2522335" y="1106160"/>
-            <a:ext cx="5917069" cy="369332"/>
+            <a:off x="3923928" y="1080050"/>
+            <a:ext cx="2965877" cy="477054"/>
           </a:xfrm>
           <a:prstGeom prst="rect">
             <a:avLst/>
@@ -12764,12 +12925,12 @@
           <a:p>
             <a:pPr algn="ctr"/>
             <a:r>
-              <a:rPr lang="en-IN" dirty="0">
+              <a:rPr lang="en-IN" sz="2500" dirty="0">
                 <a:solidFill>
                   <a:schemeClr val="bg1"/>
                 </a:solidFill>
               </a:rPr>
-              <a:t>Bivariate Analysis – Profit &amp; Loss, Income, Loan Amount</a:t>
+              <a:t>Data Insights - 9/10</a:t>
             </a:r>
           </a:p>
         </p:txBody>
@@ -12788,8 +12949,8 @@
         </p:nvSpPr>
         <p:spPr>
           <a:xfrm>
-            <a:off x="5309668" y="1916832"/>
-            <a:ext cx="3168352" cy="2677656"/>
+            <a:off x="107504" y="4883219"/>
+            <a:ext cx="8208912" cy="1384995"/>
           </a:xfrm>
           <a:prstGeom prst="rect">
             <a:avLst/>
@@ -12808,7 +12969,7 @@
             </a:pPr>
             <a:r>
               <a:rPr lang="en-IN" sz="1400" dirty="0"/>
-              <a:t>Income &lt; 200k &amp; loan amount between 10K to 40k to be scrutinized to mitigate loss risks or increase interest rate to have better recovery</a:t>
+              <a:t>Income &lt; 200K &amp; loan amount between 15K to 40K to be scrutinized to mitigate loss risks or increase interest rate to have better recovery</a:t>
             </a:r>
           </a:p>
           <a:p>
@@ -12825,7 +12986,7 @@
             </a:pPr>
             <a:r>
               <a:rPr lang="en-IN" sz="1400" dirty="0"/>
-              <a:t>Income &lt; 200k, sanction loan up to 10% of annual income </a:t>
+              <a:t>Income &lt; 200K, sanction loan up to 15% of annual income </a:t>
             </a:r>
           </a:p>
           <a:p>
@@ -12930,6 +13091,105 @@
           </a:p>
         </p:txBody>
       </p:sp>
+      <p:pic>
+        <p:nvPicPr>
+          <p:cNvPr id="1026" name="Picture 2">
+            <a:extLst>
+              <a:ext uri="{FF2B5EF4-FFF2-40B4-BE49-F238E27FC236}">
+                <a16:creationId xmlns:a16="http://schemas.microsoft.com/office/drawing/2014/main" id="{E1981D4C-4E28-ECCE-1B8B-EF7963665DF6}"/>
+              </a:ext>
+            </a:extLst>
+          </p:cNvPr>
+          <p:cNvPicPr>
+            <a:picLocks noChangeAspect="1" noChangeArrowheads="1"/>
+          </p:cNvPicPr>
+          <p:nvPr/>
+        </p:nvPicPr>
+        <p:blipFill>
+          <a:blip r:embed="rId4">
+            <a:extLst>
+              <a:ext uri="{28A0092B-C50C-407E-A947-70E740481C1C}">
+                <a14:useLocalDpi xmlns:a14="http://schemas.microsoft.com/office/drawing/2010/main" val="0"/>
+              </a:ext>
+            </a:extLst>
+          </a:blip>
+          <a:srcRect/>
+          <a:stretch>
+            <a:fillRect/>
+          </a:stretch>
+        </p:blipFill>
+        <p:spPr bwMode="auto">
+          <a:xfrm>
+            <a:off x="4403798" y="1872066"/>
+            <a:ext cx="3762375" cy="2495550"/>
+          </a:xfrm>
+          <a:prstGeom prst="rect">
+            <a:avLst/>
+          </a:prstGeom>
+          <a:noFill/>
+          <a:extLst>
+            <a:ext uri="{909E8E84-426E-40DD-AFC4-6F175D3DCCD1}">
+              <a14:hiddenFill xmlns:a14="http://schemas.microsoft.com/office/drawing/2010/main">
+                <a:solidFill>
+                  <a:srgbClr val="FFFFFF"/>
+                </a:solidFill>
+              </a14:hiddenFill>
+            </a:ext>
+          </a:extLst>
+        </p:spPr>
+      </p:pic>
+      <p:sp>
+        <p:nvSpPr>
+          <p:cNvPr id="7" name="Rectangle 6">
+            <a:extLst>
+              <a:ext uri="{FF2B5EF4-FFF2-40B4-BE49-F238E27FC236}">
+                <a16:creationId xmlns:a16="http://schemas.microsoft.com/office/drawing/2014/main" id="{46BCB315-94CE-8202-D24A-AE78F8F65F72}"/>
+              </a:ext>
+            </a:extLst>
+          </p:cNvPr>
+          <p:cNvSpPr/>
+          <p:nvPr/>
+        </p:nvSpPr>
+        <p:spPr>
+          <a:xfrm>
+            <a:off x="5076056" y="2087235"/>
+            <a:ext cx="936104" cy="2280381"/>
+          </a:xfrm>
+          <a:prstGeom prst="rect">
+            <a:avLst/>
+          </a:prstGeom>
+          <a:noFill/>
+          <a:ln>
+            <a:solidFill>
+              <a:srgbClr val="FF0000"/>
+            </a:solidFill>
+          </a:ln>
+        </p:spPr>
+        <p:style>
+          <a:lnRef idx="2">
+            <a:schemeClr val="accent3">
+              <a:shade val="50000"/>
+            </a:schemeClr>
+          </a:lnRef>
+          <a:fillRef idx="1">
+            <a:schemeClr val="accent3"/>
+          </a:fillRef>
+          <a:effectRef idx="0">
+            <a:schemeClr val="accent3"/>
+          </a:effectRef>
+          <a:fontRef idx="minor">
+            <a:schemeClr val="lt1"/>
+          </a:fontRef>
+        </p:style>
+        <p:txBody>
+          <a:bodyPr rtlCol="0" anchor="ctr"/>
+          <a:lstStyle/>
+          <a:p>
+            <a:pPr algn="ctr"/>
+            <a:endParaRPr lang="en-IN"/>
+          </a:p>
+        </p:txBody>
+      </p:sp>
     </p:spTree>
     <p:extLst>
       <p:ext uri="{BB962C8B-B14F-4D97-AF65-F5344CB8AC3E}">
@@ -13072,7 +13332,7 @@
         </p:nvSpPr>
         <p:spPr>
           <a:xfrm>
-            <a:off x="1686173" y="188640"/>
+            <a:off x="1619672" y="328916"/>
             <a:ext cx="6480000" cy="981075"/>
           </a:xfrm>
         </p:spPr>
@@ -13089,8 +13349,43 @@
                   </a:schemeClr>
                 </a:solidFill>
               </a:rPr>
-              <a:t>         Data Insights - 10/10</a:t>
-            </a:r>
+              <a:t>         Bivariate Analysis – Watch Profit </a:t>
+            </a:r>
+            <a:br>
+              <a:rPr lang="en-US" altLang="en-US" sz="3500" dirty="0">
+                <a:solidFill>
+                  <a:schemeClr val="accent1">
+                    <a:lumMod val="90000"/>
+                  </a:schemeClr>
+                </a:solidFill>
+              </a:rPr>
+            </a:br>
+            <a:r>
+              <a:rPr lang="en-US" altLang="en-US" sz="3500" dirty="0">
+                <a:solidFill>
+                  <a:schemeClr val="accent1">
+                    <a:lumMod val="90000"/>
+                  </a:schemeClr>
+                </a:solidFill>
+              </a:rPr>
+              <a:t>&amp; Loss across key variables</a:t>
+            </a:r>
+            <a:br>
+              <a:rPr lang="en-US" altLang="en-US" sz="3500" dirty="0">
+                <a:solidFill>
+                  <a:schemeClr val="accent1">
+                    <a:lumMod val="90000"/>
+                  </a:schemeClr>
+                </a:solidFill>
+              </a:rPr>
+            </a:br>
+            <a:endParaRPr lang="en-US" altLang="en-US" sz="3500" dirty="0">
+              <a:solidFill>
+                <a:schemeClr val="accent1">
+                  <a:lumMod val="90000"/>
+                </a:schemeClr>
+              </a:solidFill>
+            </a:endParaRPr>
           </a:p>
         </p:txBody>
       </p:sp>
@@ -13108,8 +13403,8 @@
         </p:nvSpPr>
         <p:spPr>
           <a:xfrm>
-            <a:off x="2270148" y="1143873"/>
-            <a:ext cx="6421438" cy="369332"/>
+            <a:off x="3629470" y="1111937"/>
+            <a:ext cx="3143809" cy="477054"/>
           </a:xfrm>
           <a:prstGeom prst="rect">
             <a:avLst/>
@@ -13124,12 +13419,12 @@
           <a:p>
             <a:pPr algn="ctr"/>
             <a:r>
-              <a:rPr lang="en-IN" dirty="0">
+              <a:rPr lang="en-IN" sz="2500" dirty="0">
                 <a:solidFill>
                   <a:schemeClr val="bg1"/>
                 </a:solidFill>
               </a:rPr>
-              <a:t>Bivariate Analysis – Watch Profit &amp; Loss across key variables</a:t>
+              <a:t>Data Insights - 10/10</a:t>
             </a:r>
           </a:p>
         </p:txBody>
@@ -13488,38 +13783,155 @@
         </p:nvSpPr>
         <p:spPr>
           <a:xfrm>
-            <a:off x="1043608" y="408672"/>
-            <a:ext cx="8161209" cy="646331"/>
+            <a:off x="1331640" y="-122243"/>
+            <a:ext cx="8161209" cy="1708160"/>
           </a:xfrm>
           <a:prstGeom prst="rect">
             <a:avLst/>
           </a:prstGeom>
           <a:noFill/>
+          <a:ln>
+            <a:noFill/>
+          </a:ln>
+          <a:effectLst/>
+          <a:extLst>
+            <a:ext uri="{909E8E84-426E-40DD-AFC4-6F175D3DCCD1}">
+              <a14:hiddenFill xmlns:a14="http://schemas.microsoft.com/office/drawing/2010/main">
+                <a:solidFill>
+                  <a:schemeClr val="accent1"/>
+                </a:solidFill>
+              </a14:hiddenFill>
+            </a:ext>
+            <a:ext uri="{91240B29-F687-4F45-9708-019B960494DF}">
+              <a14:hiddenLine xmlns:a14="http://schemas.microsoft.com/office/drawing/2010/main" w="9525">
+                <a:solidFill>
+                  <a:schemeClr val="tx1"/>
+                </a:solidFill>
+                <a:miter lim="800000"/>
+                <a:headEnd/>
+                <a:tailEnd/>
+              </a14:hiddenLine>
+            </a:ext>
+            <a:ext uri="{AF507438-7753-43E0-B8FC-AC1667EBCBE1}">
+              <a14:hiddenEffects xmlns:a14="http://schemas.microsoft.com/office/drawing/2010/main">
+                <a:effectLst>
+                  <a:outerShdw dist="35921" dir="2700000" algn="ctr" rotWithShape="0">
+                    <a:schemeClr val="bg2"/>
+                  </a:outerShdw>
+                </a:effectLst>
+              </a14:hiddenEffects>
+            </a:ext>
+          </a:extLst>
         </p:spPr>
         <p:txBody>
-          <a:bodyPr vert="horz" wrap="square" rtlCol="0" anchor="ctr" anchorCtr="1">
-            <a:spAutoFit/>
+          <a:bodyPr vert="horz" wrap="none" lIns="91440" tIns="45720" rIns="91440" bIns="45720" numCol="1" anchor="ctr" anchorCtr="1" compatLnSpc="1">
+            <a:prstTxWarp prst="textNoShape">
+              <a:avLst/>
+            </a:prstTxWarp>
           </a:bodyPr>
-          <a:lstStyle/>
-          <a:p>
-            <a:pPr algn="ctr"/>
-            <a:r>
-              <a:rPr lang="en-IN" dirty="0">
+          <a:lstStyle>
+            <a:lvl1pPr algn="ctr" eaLnBrk="1" hangingPunct="1">
+              <a:defRPr sz="3500">
                 <a:solidFill>
-                  <a:schemeClr val="bg1"/>
+                  <a:schemeClr val="accent1">
+                    <a:lumMod val="90000"/>
+                  </a:schemeClr>
                 </a:solidFill>
-              </a:rPr>
+                <a:latin typeface="+mj-lt"/>
+                <a:ea typeface="+mj-ea"/>
+                <a:cs typeface="+mj-cs"/>
+              </a:defRPr>
+            </a:lvl1pPr>
+            <a:lvl2pPr algn="ctr">
+              <a:defRPr sz="4400">
+                <a:solidFill>
+                  <a:schemeClr val="tx2"/>
+                </a:solidFill>
+              </a:defRPr>
+            </a:lvl2pPr>
+            <a:lvl3pPr algn="ctr">
+              <a:defRPr sz="4400">
+                <a:solidFill>
+                  <a:schemeClr val="tx2"/>
+                </a:solidFill>
+              </a:defRPr>
+            </a:lvl3pPr>
+            <a:lvl4pPr algn="ctr">
+              <a:defRPr sz="4400">
+                <a:solidFill>
+                  <a:schemeClr val="tx2"/>
+                </a:solidFill>
+              </a:defRPr>
+            </a:lvl4pPr>
+            <a:lvl5pPr algn="ctr">
+              <a:defRPr sz="4400">
+                <a:solidFill>
+                  <a:schemeClr val="tx2"/>
+                </a:solidFill>
+              </a:defRPr>
+            </a:lvl5pPr>
+            <a:lvl6pPr marL="457200" algn="ctr" fontAlgn="base">
+              <a:spcBef>
+                <a:spcPct val="0"/>
+              </a:spcBef>
+              <a:spcAft>
+                <a:spcPct val="0"/>
+              </a:spcAft>
+              <a:defRPr sz="4400">
+                <a:solidFill>
+                  <a:schemeClr val="tx2"/>
+                </a:solidFill>
+              </a:defRPr>
+            </a:lvl6pPr>
+            <a:lvl7pPr marL="914400" algn="ctr" fontAlgn="base">
+              <a:spcBef>
+                <a:spcPct val="0"/>
+              </a:spcBef>
+              <a:spcAft>
+                <a:spcPct val="0"/>
+              </a:spcAft>
+              <a:defRPr sz="4400">
+                <a:solidFill>
+                  <a:schemeClr val="tx2"/>
+                </a:solidFill>
+              </a:defRPr>
+            </a:lvl7pPr>
+            <a:lvl8pPr marL="1371600" algn="ctr" fontAlgn="base">
+              <a:spcBef>
+                <a:spcPct val="0"/>
+              </a:spcBef>
+              <a:spcAft>
+                <a:spcPct val="0"/>
+              </a:spcAft>
+              <a:defRPr sz="4400">
+                <a:solidFill>
+                  <a:schemeClr val="tx2"/>
+                </a:solidFill>
+              </a:defRPr>
+            </a:lvl8pPr>
+            <a:lvl9pPr marL="1828800" algn="ctr" fontAlgn="base">
+              <a:spcBef>
+                <a:spcPct val="0"/>
+              </a:spcBef>
+              <a:spcAft>
+                <a:spcPct val="0"/>
+              </a:spcAft>
+              <a:defRPr sz="4400">
+                <a:solidFill>
+                  <a:schemeClr val="tx2"/>
+                </a:solidFill>
+              </a:defRPr>
+            </a:lvl9pPr>
+          </a:lstStyle>
+          <a:p>
+            <a:r>
+              <a:rPr lang="en-IN" sz="3000" dirty="0"/>
               <a:t>The Goal was to turn data into information </a:t>
             </a:r>
           </a:p>
           <a:p>
-            <a:pPr algn="ctr"/>
-            <a:r>
-              <a:rPr lang="en-IN" dirty="0">
-                <a:solidFill>
-                  <a:schemeClr val="bg1"/>
-                </a:solidFill>
-              </a:rPr>
+            <a:r>
+              <a:rPr lang="en-IN" sz="3000" dirty="0"/>
               <a:t>and information into insights </a:t>
             </a:r>
           </a:p>
@@ -14776,7 +15188,7 @@
         </p:nvSpPr>
         <p:spPr>
           <a:xfrm>
-            <a:off x="398611" y="130143"/>
+            <a:off x="352275" y="324954"/>
             <a:ext cx="8229600" cy="981075"/>
           </a:xfrm>
         </p:spPr>
@@ -14785,16 +15197,6 @@
           <a:lstStyle/>
           <a:p>
             <a:pPr eaLnBrk="1" hangingPunct="1"/>
-            <a:r>
-              <a:rPr lang="en-US" altLang="en-US" dirty="0">
-                <a:solidFill>
-                  <a:schemeClr val="accent1">
-                    <a:lumMod val="90000"/>
-                  </a:schemeClr>
-                </a:solidFill>
-              </a:rPr>
-              <a:t>         </a:t>
-            </a:r>
             <a:r>
               <a:rPr lang="en-US" altLang="en-US" sz="3500" dirty="0">
                 <a:solidFill>
@@ -14803,8 +15205,24 @@
                   </a:schemeClr>
                 </a:solidFill>
               </a:rPr>
-              <a:t>Data Insights Summary - 1/2 </a:t>
-            </a:r>
+              <a:t>         Top View on Profit &amp; Loss</a:t>
+            </a:r>
+            <a:br>
+              <a:rPr lang="en-US" altLang="en-US" sz="3500" dirty="0">
+                <a:solidFill>
+                  <a:schemeClr val="accent1">
+                    <a:lumMod val="90000"/>
+                  </a:schemeClr>
+                </a:solidFill>
+              </a:rPr>
+            </a:br>
+            <a:endParaRPr lang="en-US" altLang="en-US" sz="3500" dirty="0">
+              <a:solidFill>
+                <a:schemeClr val="accent1">
+                  <a:lumMod val="90000"/>
+                </a:schemeClr>
+              </a:solidFill>
+            </a:endParaRPr>
           </a:p>
         </p:txBody>
       </p:sp>
@@ -14823,13 +15241,13 @@
           <p:nvPr>
             <p:extLst>
               <p:ext uri="{D42A27DB-BD31-4B8C-83A1-F6EECF244321}">
-                <p14:modId xmlns:p14="http://schemas.microsoft.com/office/powerpoint/2010/main" val="4195142546"/>
+                <p14:modId xmlns:p14="http://schemas.microsoft.com/office/powerpoint/2010/main" val="2931175580"/>
               </p:ext>
             </p:extLst>
           </p:nvPr>
         </p:nvGraphicFramePr>
         <p:xfrm>
-          <a:off x="1331640" y="2553958"/>
+          <a:off x="1655675" y="2117749"/>
           <a:ext cx="5832649" cy="2387209"/>
         </p:xfrm>
         <a:graphic>
@@ -15276,8 +15694,8 @@
         </p:nvSpPr>
         <p:spPr>
           <a:xfrm>
-            <a:off x="3059832" y="1103524"/>
-            <a:ext cx="4254646" cy="477054"/>
+            <a:off x="2195736" y="1117007"/>
+            <a:ext cx="5694806" cy="477054"/>
           </a:xfrm>
           <a:prstGeom prst="rect">
             <a:avLst/>
@@ -15297,7 +15715,7 @@
                   <a:schemeClr val="bg1"/>
                 </a:solidFill>
               </a:rPr>
-              <a:t>Top View on Profit &amp; Loss</a:t>
+              <a:t>Data Insights Summary - 1/2 </a:t>
             </a:r>
           </a:p>
         </p:txBody>
@@ -15316,7 +15734,7 @@
         </p:nvSpPr>
         <p:spPr>
           <a:xfrm>
-            <a:off x="755576" y="5517232"/>
+            <a:off x="498374" y="4797152"/>
             <a:ext cx="8222254" cy="738664"/>
           </a:xfrm>
           <a:prstGeom prst="rect">
@@ -15442,8 +15860,8 @@
         </p:nvSpPr>
         <p:spPr>
           <a:xfrm>
-            <a:off x="396470" y="116632"/>
-            <a:ext cx="8229600" cy="981075"/>
+            <a:off x="1201451" y="69554"/>
+            <a:ext cx="7330989" cy="981075"/>
           </a:xfrm>
         </p:spPr>
         <p:txBody>
@@ -15459,7 +15877,7 @@
                   </a:schemeClr>
                 </a:solidFill>
               </a:rPr>
-              <a:t>         Data Insights Summary - 2/2 </a:t>
+              <a:t>Defaulters - Driving factors &amp; Recommendation </a:t>
             </a:r>
           </a:p>
         </p:txBody>
@@ -15619,7 +16037,7 @@
         <p:spPr>
           <a:xfrm>
             <a:off x="6785992" y="4356006"/>
-            <a:ext cx="1944216" cy="646331"/>
+            <a:ext cx="1944216" cy="830997"/>
           </a:xfrm>
           <a:prstGeom prst="rect">
             <a:avLst/>
@@ -15636,7 +16054,7 @@
               <a:rPr lang="en-IN" sz="1200" dirty="0">
                 <a:latin typeface="+mn-lt"/>
               </a:rPr>
-              <a:t>Reduce loan sanction for small business or scrutinize deep </a:t>
+              <a:t>Reduce loan sanction for purpose as small business or scrutinize deep </a:t>
             </a:r>
           </a:p>
         </p:txBody>
@@ -15655,7 +16073,7 @@
         </p:nvSpPr>
         <p:spPr>
           <a:xfrm>
-            <a:off x="6876256" y="5479623"/>
+            <a:off x="6804248" y="5668866"/>
             <a:ext cx="1944216" cy="646331"/>
           </a:xfrm>
           <a:prstGeom prst="rect">
@@ -15817,7 +16235,7 @@
               </a:pPr>
               <a:r>
                 <a:rPr lang="en-IN" sz="1200" kern="1200" dirty="0"/>
-                <a:t>Reject loan amount &gt; 10%  of </a:t>
+                <a:t>Reject loan amount &gt; 15%  of </a:t>
               </a:r>
               <a:r>
                 <a:rPr lang="en-IN" sz="1200" kern="1200" dirty="0">
@@ -15836,7 +16254,7 @@
               </a:r>
               <a:r>
                 <a:rPr lang="en-IN" sz="1200" kern="1200" dirty="0"/>
-                <a:t> income for income &lt;= 200K</a:t>
+                <a:t> income for income &lt; 200K</a:t>
               </a:r>
             </a:p>
           </p:txBody>
@@ -15856,7 +16274,7 @@
         </p:nvSpPr>
         <p:spPr>
           <a:xfrm>
-            <a:off x="179512" y="1997838"/>
+            <a:off x="251520" y="4158877"/>
             <a:ext cx="2498633" cy="1015663"/>
           </a:xfrm>
           <a:prstGeom prst="rect">
@@ -15896,8 +16314,8 @@
         </p:nvSpPr>
         <p:spPr>
           <a:xfrm>
-            <a:off x="2411760" y="998781"/>
-            <a:ext cx="5507842" cy="477054"/>
+            <a:off x="1151620" y="1055438"/>
+            <a:ext cx="7416824" cy="477054"/>
           </a:xfrm>
           <a:prstGeom prst="rect">
             <a:avLst/>
@@ -15917,7 +16335,7 @@
                   <a:schemeClr val="bg1"/>
                 </a:solidFill>
               </a:rPr>
-              <a:t>Listing driving factors for defaulters  </a:t>
+              <a:t>Data Insights Summary - 2/2   </a:t>
             </a:r>
           </a:p>
         </p:txBody>
@@ -15936,7 +16354,7 @@
         </p:nvSpPr>
         <p:spPr>
           <a:xfrm>
-            <a:off x="179512" y="3648679"/>
+            <a:off x="179512" y="1868455"/>
             <a:ext cx="1944216" cy="646331"/>
           </a:xfrm>
           <a:prstGeom prst="rect">
@@ -15973,7 +16391,7 @@
         </p:nvSpPr>
         <p:spPr>
           <a:xfrm>
-            <a:off x="199241" y="5349906"/>
+            <a:off x="199241" y="3038792"/>
             <a:ext cx="1944216" cy="646331"/>
           </a:xfrm>
           <a:prstGeom prst="rect">
@@ -16011,7 +16429,7 @@
         </p:nvSpPr>
         <p:spPr>
           <a:xfrm>
-            <a:off x="277180" y="1849451"/>
+            <a:off x="338253" y="4005064"/>
             <a:ext cx="216024" cy="185856"/>
           </a:xfrm>
           <a:prstGeom prst="actionButtonInformation">
@@ -16058,7 +16476,7 @@
         </p:nvSpPr>
         <p:spPr>
           <a:xfrm>
-            <a:off x="271568" y="3481032"/>
+            <a:off x="271568" y="1700808"/>
             <a:ext cx="216024" cy="185856"/>
           </a:xfrm>
           <a:prstGeom prst="actionButtonInformation">
@@ -16105,7 +16523,7 @@
         </p:nvSpPr>
         <p:spPr>
           <a:xfrm>
-            <a:off x="271568" y="5164050"/>
+            <a:off x="271568" y="2852936"/>
             <a:ext cx="216024" cy="185856"/>
           </a:xfrm>
           <a:prstGeom prst="actionButtonInformation">
@@ -16293,7 +16711,92 @@
         </p:nvSpPr>
         <p:spPr>
           <a:xfrm>
-            <a:off x="6888315" y="5327989"/>
+            <a:off x="6816307" y="5517232"/>
+            <a:ext cx="216024" cy="185856"/>
+          </a:xfrm>
+          <a:prstGeom prst="actionButtonInformation">
+            <a:avLst/>
+          </a:prstGeom>
+        </p:spPr>
+        <p:style>
+          <a:lnRef idx="2">
+            <a:schemeClr val="accent1">
+              <a:shade val="50000"/>
+            </a:schemeClr>
+          </a:lnRef>
+          <a:fillRef idx="1">
+            <a:schemeClr val="accent1"/>
+          </a:fillRef>
+          <a:effectRef idx="0">
+            <a:schemeClr val="accent1"/>
+          </a:effectRef>
+          <a:fontRef idx="minor">
+            <a:schemeClr val="lt1"/>
+          </a:fontRef>
+        </p:style>
+        <p:txBody>
+          <a:bodyPr rtlCol="0" anchor="ctr"/>
+          <a:lstStyle/>
+          <a:p>
+            <a:pPr algn="ctr"/>
+            <a:endParaRPr lang="en-IN"/>
+          </a:p>
+        </p:txBody>
+      </p:sp>
+      <p:sp>
+        <p:nvSpPr>
+          <p:cNvPr id="10" name="TextBox 9">
+            <a:extLst>
+              <a:ext uri="{FF2B5EF4-FFF2-40B4-BE49-F238E27FC236}">
+                <a16:creationId xmlns:a16="http://schemas.microsoft.com/office/drawing/2014/main" id="{1BF06A0C-0722-7AF0-FE48-402DDDED124F}"/>
+              </a:ext>
+            </a:extLst>
+          </p:cNvPr>
+          <p:cNvSpPr txBox="1"/>
+          <p:nvPr/>
+        </p:nvSpPr>
+        <p:spPr>
+          <a:xfrm>
+            <a:off x="272368" y="5557270"/>
+            <a:ext cx="1944216" cy="646331"/>
+          </a:xfrm>
+          <a:prstGeom prst="rect">
+            <a:avLst/>
+          </a:prstGeom>
+          <a:noFill/>
+        </p:spPr>
+        <p:txBody>
+          <a:bodyPr wrap="square" rtlCol="0">
+            <a:spAutoFit/>
+          </a:bodyPr>
+          <a:lstStyle/>
+          <a:p>
+            <a:r>
+              <a:rPr lang="en-IN" sz="1200" dirty="0"/>
+              <a:t>Reduce providing loans as well as reduce loan amount for Rent category</a:t>
+            </a:r>
+            <a:endParaRPr lang="en-IN" sz="1200" dirty="0">
+              <a:latin typeface="+mn-lt"/>
+            </a:endParaRPr>
+          </a:p>
+        </p:txBody>
+      </p:sp>
+      <p:sp>
+        <p:nvSpPr>
+          <p:cNvPr id="11" name="Action Button: Get Information 10">
+            <a:hlinkClick r:id="rId10" action="ppaction://hlinksldjump" highlightClick="1"/>
+            <a:extLst>
+              <a:ext uri="{FF2B5EF4-FFF2-40B4-BE49-F238E27FC236}">
+                <a16:creationId xmlns:a16="http://schemas.microsoft.com/office/drawing/2014/main" id="{3020CDF1-2997-7B12-4934-58EED80FEA62}"/>
+              </a:ext>
+            </a:extLst>
+          </p:cNvPr>
+          <p:cNvSpPr/>
+          <p:nvPr/>
+        </p:nvSpPr>
+        <p:spPr>
+          <a:xfrm>
+            <a:off x="344695" y="5371414"/>
             <a:ext cx="216024" cy="185856"/>
           </a:xfrm>
           <a:prstGeom prst="actionButtonInformation">
@@ -17034,7 +17537,7 @@
                   </a:schemeClr>
                 </a:solidFill>
               </a:rPr>
-              <a:t>         Data Insights - 1/10  </a:t>
+              <a:t>         Univariate Analysis</a:t>
             </a:r>
           </a:p>
         </p:txBody>
@@ -17053,7 +17556,7 @@
         </p:nvSpPr>
         <p:spPr>
           <a:xfrm>
-            <a:off x="3839362" y="1074994"/>
+            <a:off x="3709134" y="990060"/>
             <a:ext cx="2958502" cy="477054"/>
           </a:xfrm>
           <a:prstGeom prst="rect">
@@ -17069,13 +17572,18 @@
           <a:p>
             <a:pPr algn="ctr"/>
             <a:r>
-              <a:rPr lang="en-IN" sz="2500" dirty="0">
+              <a:rPr lang="en-IN" sz="2500">
                 <a:solidFill>
                   <a:schemeClr val="bg1"/>
                 </a:solidFill>
               </a:rPr>
-              <a:t>Univariate Analysis  </a:t>
-            </a:r>
+              <a:t>Data Insights - 1/10 </a:t>
+            </a:r>
+            <a:endParaRPr lang="en-IN" sz="2500" dirty="0">
+              <a:solidFill>
+                <a:schemeClr val="bg1"/>
+              </a:solidFill>
+            </a:endParaRPr>
           </a:p>
         </p:txBody>
       </p:sp>
@@ -17405,7 +17913,7 @@
                   </a:schemeClr>
                 </a:solidFill>
               </a:rPr>
-              <a:t>         Data Insights - 2/10</a:t>
+              <a:t>         Segmented Univariate Analysis</a:t>
             </a:r>
           </a:p>
         </p:txBody>
@@ -17424,8 +17932,8 @@
         </p:nvSpPr>
         <p:spPr>
           <a:xfrm>
-            <a:off x="3037875" y="1046275"/>
-            <a:ext cx="4796442" cy="477054"/>
+            <a:off x="3851920" y="910739"/>
+            <a:ext cx="2965877" cy="477054"/>
           </a:xfrm>
           <a:prstGeom prst="rect">
             <a:avLst/>
@@ -17440,13 +17948,18 @@
           <a:p>
             <a:pPr algn="ctr"/>
             <a:r>
-              <a:rPr lang="en-IN" sz="2500" dirty="0">
+              <a:rPr lang="en-IN" sz="2500">
                 <a:solidFill>
                   <a:schemeClr val="bg1"/>
                 </a:solidFill>
               </a:rPr>
-              <a:t>Segmented Univariate Analysis  </a:t>
-            </a:r>
+              <a:t>Data Insights - 2/10</a:t>
+            </a:r>
+            <a:endParaRPr lang="en-IN" sz="2500" dirty="0">
+              <a:solidFill>
+                <a:schemeClr val="bg1"/>
+              </a:solidFill>
+            </a:endParaRPr>
           </a:p>
         </p:txBody>
       </p:sp>
@@ -18066,7 +18579,7 @@
         </p:nvSpPr>
         <p:spPr>
           <a:xfrm>
-            <a:off x="1686173" y="188640"/>
+            <a:off x="2250208" y="217621"/>
             <a:ext cx="6480000" cy="981075"/>
           </a:xfrm>
         </p:spPr>
@@ -18083,8 +18596,24 @@
                   </a:schemeClr>
                 </a:solidFill>
               </a:rPr>
-              <a:t>         Data Insights - 3/10</a:t>
-            </a:r>
+              <a:t>Bivariate Analysis – Year &amp; Term  </a:t>
+            </a:r>
+            <a:br>
+              <a:rPr lang="en-US" altLang="en-US" sz="3500" dirty="0">
+                <a:solidFill>
+                  <a:schemeClr val="accent1">
+                    <a:lumMod val="90000"/>
+                  </a:schemeClr>
+                </a:solidFill>
+              </a:rPr>
+            </a:br>
+            <a:endParaRPr lang="en-US" altLang="en-US" sz="3500" dirty="0">
+              <a:solidFill>
+                <a:schemeClr val="accent1">
+                  <a:lumMod val="90000"/>
+                </a:schemeClr>
+              </a:solidFill>
+            </a:endParaRPr>
           </a:p>
         </p:txBody>
       </p:sp>
@@ -18102,8 +18631,8 @@
         </p:nvSpPr>
         <p:spPr>
           <a:xfrm>
-            <a:off x="2675252" y="1090012"/>
-            <a:ext cx="5611216" cy="477054"/>
+            <a:off x="3635896" y="960169"/>
+            <a:ext cx="3055645" cy="477054"/>
           </a:xfrm>
           <a:prstGeom prst="rect">
             <a:avLst/>
@@ -18123,7 +18652,7 @@
                   <a:schemeClr val="bg1"/>
                 </a:solidFill>
               </a:rPr>
-              <a:t>Bivariate Analysis – Year &amp; Term wise </a:t>
+              <a:t> Data Insights - 3/10</a:t>
             </a:r>
           </a:p>
         </p:txBody>
@@ -18535,7 +19064,7 @@
         </p:nvSpPr>
         <p:spPr>
           <a:xfrm>
-            <a:off x="1621501" y="21717"/>
+            <a:off x="1691680" y="341857"/>
             <a:ext cx="6480000" cy="981075"/>
           </a:xfrm>
         </p:spPr>
@@ -18552,8 +19081,43 @@
                   </a:schemeClr>
                 </a:solidFill>
               </a:rPr>
-              <a:t>         Data Insights - 4/10</a:t>
-            </a:r>
+              <a:t>         Bivariate Analysis – </a:t>
+            </a:r>
+            <a:br>
+              <a:rPr lang="en-US" altLang="en-US" sz="3500" dirty="0">
+                <a:solidFill>
+                  <a:schemeClr val="accent1">
+                    <a:lumMod val="90000"/>
+                  </a:schemeClr>
+                </a:solidFill>
+              </a:rPr>
+            </a:br>
+            <a:r>
+              <a:rPr lang="en-US" altLang="en-US" sz="3500" dirty="0">
+                <a:solidFill>
+                  <a:schemeClr val="accent1">
+                    <a:lumMod val="90000"/>
+                  </a:schemeClr>
+                </a:solidFill>
+              </a:rPr>
+              <a:t>Employee Length &amp; Purpose</a:t>
+            </a:r>
+            <a:br>
+              <a:rPr lang="en-US" altLang="en-US" sz="3500" dirty="0">
+                <a:solidFill>
+                  <a:schemeClr val="accent1">
+                    <a:lumMod val="90000"/>
+                  </a:schemeClr>
+                </a:solidFill>
+              </a:rPr>
+            </a:br>
+            <a:endParaRPr lang="en-US" altLang="en-US" sz="3500" dirty="0">
+              <a:solidFill>
+                <a:schemeClr val="accent1">
+                  <a:lumMod val="90000"/>
+                </a:schemeClr>
+              </a:solidFill>
+            </a:endParaRPr>
           </a:p>
         </p:txBody>
       </p:sp>
@@ -18571,7 +19135,7 @@
         </p:nvSpPr>
         <p:spPr>
           <a:xfrm>
-            <a:off x="1594333" y="1029072"/>
+            <a:off x="1334971" y="1049317"/>
             <a:ext cx="7522499" cy="477054"/>
           </a:xfrm>
           <a:prstGeom prst="rect">
@@ -18592,7 +19156,7 @@
                   <a:schemeClr val="bg1"/>
                 </a:solidFill>
               </a:rPr>
-              <a:t>Bivariate Analysis – Employee Length &amp; Purpose</a:t>
+              <a:t>Data Insights - 4/10</a:t>
             </a:r>
           </a:p>
         </p:txBody>

</xml_diff>